<commit_message>
Delete extra examples and add comments
</commit_message>
<xml_diff>
--- a/05_casts/05_Type_Conversion.pptx
+++ b/05_casts/05_Type_Conversion.pptx
@@ -267,7 +267,7 @@
                 <a:latin typeface="Intel Clear"/>
               </a:rPr>
               <a:pPr/>
-              <a:t>08-Jun-20</a:t>
+              <a:t>16-Jul-20</a:t>
             </a:fld>
             <a:endParaRPr lang="en-US" dirty="0">
               <a:latin typeface="Intel Clear"/>
@@ -447,7 +447,7 @@
             <a:fld id="{ED7FC5FE-6F0D-D34A-8EE6-C95B4F5F4DC8}" type="datetimeFigureOut">
               <a:rPr lang="en-US" smtClean="0"/>
               <a:pPr/>
-              <a:t>08-Jun-20</a:t>
+              <a:t>16-Jul-20</a:t>
             </a:fld>
             <a:endParaRPr lang="en-US" dirty="0"/>
           </a:p>
@@ -3675,7 +3675,7 @@
             <a:fld id="{B61BEF0D-F0BB-DE4B-95CE-6DB70DBA9567}" type="datetimeFigureOut">
               <a:rPr lang="en-US" smtClean="0"/>
               <a:pPr/>
-              <a:t>08-Jun-20</a:t>
+              <a:t>16-Jul-20</a:t>
             </a:fld>
             <a:endParaRPr lang="en-US" dirty="0"/>
           </a:p>
@@ -3875,7 +3875,7 @@
           <a:p>
             <a:fld id="{55C6B4A9-1611-4792-9094-5F34BCA07E0B}" type="datetimeFigureOut">
               <a:rPr lang="en-US" smtClean="0"/>
-              <a:t>08-Jun-20</a:t>
+              <a:t>16-Jul-20</a:t>
             </a:fld>
             <a:endParaRPr lang="en-US" dirty="0"/>
           </a:p>
@@ -4086,7 +4086,7 @@
             <a:fld id="{B61BEF0D-F0BB-DE4B-95CE-6DB70DBA9567}" type="datetimeFigureOut">
               <a:rPr lang="en-US" smtClean="0"/>
               <a:pPr/>
-              <a:t>08-Jun-20</a:t>
+              <a:t>16-Jul-20</a:t>
             </a:fld>
             <a:endParaRPr lang="en-US" dirty="0"/>
           </a:p>
@@ -4478,7 +4478,7 @@
           <a:noFill/>
           <a:extLst>
             <a:ext uri="{909E8E84-426E-40dd-AFC4-6F175D3DCCD1}">
-              <a14:hiddenFill xmlns:a14="http://schemas.microsoft.com/office/drawing/2010/main" xmlns="">
+              <a14:hiddenFill xmlns="" xmlns:a14="http://schemas.microsoft.com/office/drawing/2010/main">
                 <a:solidFill>
                   <a:srgbClr val="FFFFFF"/>
                 </a:solidFill>
@@ -6503,7 +6503,7 @@
             <a:fld id="{B61BEF0D-F0BB-DE4B-95CE-6DB70DBA9567}" type="datetimeFigureOut">
               <a:rPr lang="en-US" smtClean="0"/>
               <a:pPr/>
-              <a:t>08-Jun-20</a:t>
+              <a:t>16-Jul-20</a:t>
             </a:fld>
             <a:endParaRPr lang="en-US" dirty="0"/>
           </a:p>
@@ -7706,7 +7706,7 @@
             <a:fld id="{B61BEF0D-F0BB-DE4B-95CE-6DB70DBA9567}" type="datetimeFigureOut">
               <a:rPr lang="en-US" smtClean="0"/>
               <a:pPr/>
-              <a:t>08-Jun-20</a:t>
+              <a:t>16-Jul-20</a:t>
             </a:fld>
             <a:endParaRPr lang="en-US" dirty="0"/>
           </a:p>
@@ -7973,7 +7973,7 @@
           <a:p>
             <a:fld id="{EB712588-04B1-427B-82EE-E8DB90309F08}" type="datetimeFigureOut">
               <a:rPr lang="en-US" smtClean="0"/>
-              <a:t>08-Jun-20</a:t>
+              <a:t>16-Jul-20</a:t>
             </a:fld>
             <a:endParaRPr lang="en-US" dirty="0"/>
           </a:p>
@@ -8388,7 +8388,7 @@
             <a:fld id="{B61BEF0D-F0BB-DE4B-95CE-6DB70DBA9567}" type="datetimeFigureOut">
               <a:rPr lang="en-US" smtClean="0"/>
               <a:pPr/>
-              <a:t>08-Jun-20</a:t>
+              <a:t>16-Jul-20</a:t>
             </a:fld>
             <a:endParaRPr lang="en-US" dirty="0"/>
           </a:p>
@@ -8532,7 +8532,7 @@
             <a:fld id="{B61BEF0D-F0BB-DE4B-95CE-6DB70DBA9567}" type="datetimeFigureOut">
               <a:rPr lang="en-US" smtClean="0"/>
               <a:pPr/>
-              <a:t>08-Jun-20</a:t>
+              <a:t>16-Jul-20</a:t>
             </a:fld>
             <a:endParaRPr lang="en-US" dirty="0"/>
           </a:p>
@@ -8659,7 +8659,7 @@
             <a:fld id="{B61BEF0D-F0BB-DE4B-95CE-6DB70DBA9567}" type="datetimeFigureOut">
               <a:rPr lang="en-US" smtClean="0"/>
               <a:pPr/>
-              <a:t>08-Jun-20</a:t>
+              <a:t>16-Jul-20</a:t>
             </a:fld>
             <a:endParaRPr lang="en-US" dirty="0"/>
           </a:p>
@@ -8983,7 +8983,7 @@
           <a:p>
             <a:fld id="{42A54C80-263E-416B-A8E0-580EDEADCBDC}" type="datetimeFigureOut">
               <a:rPr lang="en-US" smtClean="0"/>
-              <a:t>08-Jun-20</a:t>
+              <a:t>16-Jul-20</a:t>
             </a:fld>
             <a:endParaRPr lang="en-US" dirty="0"/>
           </a:p>
@@ -9274,7 +9274,7 @@
             <a:fld id="{B61BEF0D-F0BB-DE4B-95CE-6DB70DBA9567}" type="datetimeFigureOut">
               <a:rPr lang="en-US" smtClean="0"/>
               <a:pPr/>
-              <a:t>08-Jun-20</a:t>
+              <a:t>16-Jul-20</a:t>
             </a:fld>
             <a:endParaRPr lang="en-US" dirty="0"/>
           </a:p>
@@ -9518,7 +9518,7 @@
             <a:fld id="{B61BEF0D-F0BB-DE4B-95CE-6DB70DBA9567}" type="datetimeFigureOut">
               <a:rPr lang="en-US" smtClean="0"/>
               <a:pPr/>
-              <a:t>08-Jun-20</a:t>
+              <a:t>16-Jul-20</a:t>
             </a:fld>
             <a:endParaRPr lang="en-US" dirty="0"/>
           </a:p>
@@ -17548,7 +17548,7 @@
                 <a:latin typeface="Courier New" panose="02070309020205020404" pitchFamily="49" charset="0"/>
                 <a:cs typeface="Courier New" panose="02070309020205020404" pitchFamily="49" charset="0"/>
               </a:rPr>
-              <a:t>	#include &lt;iostream&gt;</a:t>
+              <a:t>     #include &lt;iostream&gt;</a:t>
             </a:r>
             <a:endParaRPr lang="ru-RU" sz="1200" dirty="0">
               <a:latin typeface="Courier New" panose="02070309020205020404" pitchFamily="49" charset="0"/>
@@ -17557,18 +17557,11 @@
           </a:p>
           <a:p>
             <a:r>
-              <a:rPr lang="ru-RU" sz="1200" dirty="0">
-                <a:latin typeface="Courier New" panose="02070309020205020404" pitchFamily="49" charset="0"/>
-                <a:cs typeface="Courier New" panose="02070309020205020404" pitchFamily="49" charset="0"/>
-              </a:rPr>
-              <a:t>	</a:t>
-            </a:r>
-            <a:r>
               <a:rPr lang="en-US" sz="1200" dirty="0">
                 <a:latin typeface="Courier New" panose="02070309020205020404" pitchFamily="49" charset="0"/>
                 <a:cs typeface="Courier New" panose="02070309020205020404" pitchFamily="49" charset="0"/>
               </a:rPr>
-              <a:t>#include "</a:t>
+              <a:t>     #include "</a:t>
             </a:r>
             <a:r>
               <a:rPr lang="en-US" sz="1200" dirty="0" err="1">
@@ -17857,7 +17850,7 @@
                 <a:latin typeface="Courier New" panose="02070309020205020404" pitchFamily="49" charset="0"/>
                 <a:cs typeface="Courier New" panose="02070309020205020404" pitchFamily="49" charset="0"/>
               </a:rPr>
-              <a:t>	#include &lt;iostream&gt;</a:t>
+              <a:t>     #include &lt;iostream&gt;</a:t>
             </a:r>
           </a:p>
           <a:p>
@@ -19324,7 +19317,7 @@
                 <a:latin typeface="Courier New" panose="02070309020205020404" pitchFamily="49" charset="0"/>
                 <a:cs typeface="Courier New" panose="02070309020205020404" pitchFamily="49" charset="0"/>
               </a:rPr>
-              <a:t>	#include &lt;iostream&gt;</a:t>
+              <a:t>     #include &lt;iostream&gt;</a:t>
             </a:r>
             <a:endParaRPr lang="ru-RU" sz="1200" dirty="0">
               <a:latin typeface="Courier New" panose="02070309020205020404" pitchFamily="49" charset="0"/>
@@ -19333,18 +19326,11 @@
           </a:p>
           <a:p>
             <a:r>
-              <a:rPr lang="ru-RU" sz="1200" dirty="0">
-                <a:latin typeface="Courier New" panose="02070309020205020404" pitchFamily="49" charset="0"/>
-                <a:cs typeface="Courier New" panose="02070309020205020404" pitchFamily="49" charset="0"/>
-              </a:rPr>
-              <a:t>	</a:t>
-            </a:r>
-            <a:r>
               <a:rPr lang="en-US" sz="1200" dirty="0">
                 <a:latin typeface="Courier New" panose="02070309020205020404" pitchFamily="49" charset="0"/>
                 <a:cs typeface="Courier New" panose="02070309020205020404" pitchFamily="49" charset="0"/>
               </a:rPr>
-              <a:t>#include "</a:t>
+              <a:t>     #include "</a:t>
             </a:r>
             <a:r>
               <a:rPr lang="en-US" sz="1200" dirty="0" err="1">
@@ -19928,7 +19914,7 @@
                 <a:latin typeface="Courier New" panose="02070309020205020404" pitchFamily="49" charset="0"/>
                 <a:cs typeface="Courier New" panose="02070309020205020404" pitchFamily="49" charset="0"/>
               </a:rPr>
-              <a:t>	#include &lt;iostream&gt;</a:t>
+              <a:t>     #include &lt;iostream&gt;</a:t>
             </a:r>
             <a:endParaRPr lang="ru-RU" sz="1200" dirty="0">
               <a:latin typeface="Courier New" panose="02070309020205020404" pitchFamily="49" charset="0"/>
@@ -19937,18 +19923,11 @@
           </a:p>
           <a:p>
             <a:r>
-              <a:rPr lang="ru-RU" sz="1200" dirty="0">
-                <a:latin typeface="Courier New" panose="02070309020205020404" pitchFamily="49" charset="0"/>
-                <a:cs typeface="Courier New" panose="02070309020205020404" pitchFamily="49" charset="0"/>
-              </a:rPr>
-              <a:t>	</a:t>
-            </a:r>
-            <a:r>
               <a:rPr lang="en-US" sz="1200" dirty="0">
                 <a:latin typeface="Courier New" panose="02070309020205020404" pitchFamily="49" charset="0"/>
                 <a:cs typeface="Courier New" panose="02070309020205020404" pitchFamily="49" charset="0"/>
               </a:rPr>
-              <a:t>#include "</a:t>
+              <a:t>     #include "</a:t>
             </a:r>
             <a:r>
               <a:rPr lang="en-US" sz="1200" dirty="0" err="1">
@@ -21811,7 +21790,7 @@
                 <a:latin typeface="Courier New" panose="02070309020205020404" pitchFamily="49" charset="0"/>
                 <a:cs typeface="Courier New" panose="02070309020205020404" pitchFamily="49" charset="0"/>
               </a:rPr>
-              <a:t>	#include &lt;iostream&gt;</a:t>
+              <a:t>     #include &lt;iostream&gt;</a:t>
             </a:r>
             <a:endParaRPr lang="ru-RU" sz="1200" dirty="0">
               <a:latin typeface="Courier New" panose="02070309020205020404" pitchFamily="49" charset="0"/>
@@ -21820,18 +21799,11 @@
           </a:p>
           <a:p>
             <a:r>
-              <a:rPr lang="ru-RU" sz="1200" dirty="0">
-                <a:latin typeface="Courier New" panose="02070309020205020404" pitchFamily="49" charset="0"/>
-                <a:cs typeface="Courier New" panose="02070309020205020404" pitchFamily="49" charset="0"/>
-              </a:rPr>
-              <a:t>	</a:t>
-            </a:r>
-            <a:r>
               <a:rPr lang="en-US" sz="1200" dirty="0">
                 <a:latin typeface="Courier New" panose="02070309020205020404" pitchFamily="49" charset="0"/>
                 <a:cs typeface="Courier New" panose="02070309020205020404" pitchFamily="49" charset="0"/>
               </a:rPr>
-              <a:t>#include "</a:t>
+              <a:t>     #include "</a:t>
             </a:r>
             <a:r>
               <a:rPr lang="en-US" sz="1200" dirty="0" err="1">
@@ -22219,7 +22191,7 @@
                 <a:latin typeface="Courier New" panose="02070309020205020404" pitchFamily="49" charset="0"/>
                 <a:cs typeface="Courier New" panose="02070309020205020404" pitchFamily="49" charset="0"/>
               </a:rPr>
-              <a:t>	#include &lt;iostream&gt;</a:t>
+              <a:t>     #include &lt;iostream&gt;</a:t>
             </a:r>
             <a:endParaRPr lang="ru-RU" sz="1200" dirty="0">
               <a:latin typeface="Courier New" panose="02070309020205020404" pitchFamily="49" charset="0"/>
@@ -22228,18 +22200,11 @@
           </a:p>
           <a:p>
             <a:r>
-              <a:rPr lang="ru-RU" sz="1200" dirty="0">
-                <a:latin typeface="Courier New" panose="02070309020205020404" pitchFamily="49" charset="0"/>
-                <a:cs typeface="Courier New" panose="02070309020205020404" pitchFamily="49" charset="0"/>
-              </a:rPr>
-              <a:t>	</a:t>
-            </a:r>
-            <a:r>
               <a:rPr lang="en-US" sz="1200" dirty="0">
                 <a:latin typeface="Courier New" panose="02070309020205020404" pitchFamily="49" charset="0"/>
                 <a:cs typeface="Courier New" panose="02070309020205020404" pitchFamily="49" charset="0"/>
               </a:rPr>
-              <a:t>#include "</a:t>
+              <a:t>     #include "</a:t>
             </a:r>
             <a:r>
               <a:rPr lang="en-US" sz="1200" dirty="0" err="1">
@@ -24131,7 +24096,7 @@
                 <a:latin typeface="Courier New" panose="02070309020205020404" pitchFamily="49" charset="0"/>
                 <a:cs typeface="Courier New" panose="02070309020205020404" pitchFamily="49" charset="0"/>
               </a:rPr>
-              <a:t>	#include &lt;iostream&gt;</a:t>
+              <a:t>     #include &lt;iostream&gt;</a:t>
             </a:r>
           </a:p>
           <a:p>
@@ -24406,7 +24371,7 @@
                 <a:latin typeface="Courier New" panose="02070309020205020404" pitchFamily="49" charset="0"/>
                 <a:cs typeface="Courier New" panose="02070309020205020404" pitchFamily="49" charset="0"/>
               </a:rPr>
-              <a:t>	#include &lt;iostream&gt;</a:t>
+              <a:t>     #include &lt;iostream&gt;</a:t>
             </a:r>
           </a:p>
           <a:p>

</xml_diff>

<commit_message>
Rename files and remove extra examples
</commit_message>
<xml_diff>
--- a/05_casts/05_Type_Conversion.pptx
+++ b/05_casts/05_Type_Conversion.pptx
@@ -115,6 +115,14 @@
     </p:ext>
   </p:extLst>
 </p:presentation>
+</file>
+
+<file path=ppt/revisionInfo.xml><?xml version="1.0" encoding="utf-8"?>
+<p1510:revInfo xmlns:a="http://schemas.openxmlformats.org/drawingml/2006/main" xmlns:r="http://schemas.openxmlformats.org/officeDocument/2006/relationships" xmlns:p1510="http://schemas.microsoft.com/office/powerpoint/2015/10/main">
+  <p1510:revLst>
+    <p1510:client id="{0DB80E9F-0DA5-42D0-A28D-9262C50F652D}" v="2" dt="2021-06-09T12:08:59.919"/>
+  </p1510:revLst>
+</p1510:revInfo>
 </file>
 
 <file path=ppt/changesInfos/changesInfo1.xml><?xml version="1.0" encoding="utf-8"?>
@@ -695,6 +703,61 @@
       </pc:sldMasterChg>
     </pc:docChg>
   </pc:docChgLst>
+  <pc:docChgLst>
+    <pc:chgData name="Kumbrasev, Pavel" userId="426a0dbc-cadc-4d77-a483-9a0decc8d1d4" providerId="ADAL" clId="{0DB80E9F-0DA5-42D0-A28D-9262C50F652D}"/>
+    <pc:docChg chg="modSld">
+      <pc:chgData name="Kumbrasev, Pavel" userId="426a0dbc-cadc-4d77-a483-9a0decc8d1d4" providerId="ADAL" clId="{0DB80E9F-0DA5-42D0-A28D-9262C50F652D}" dt="2021-06-09T12:09:03.994" v="6" actId="6549"/>
+      <pc:docMkLst>
+        <pc:docMk/>
+      </pc:docMkLst>
+      <pc:sldChg chg="modSp mod">
+        <pc:chgData name="Kumbrasev, Pavel" userId="426a0dbc-cadc-4d77-a483-9a0decc8d1d4" providerId="ADAL" clId="{0DB80E9F-0DA5-42D0-A28D-9262C50F652D}" dt="2021-06-07T11:54:39.600" v="0" actId="20577"/>
+        <pc:sldMkLst>
+          <pc:docMk/>
+          <pc:sldMk cId="2310096094" sldId="297"/>
+        </pc:sldMkLst>
+        <pc:spChg chg="mod">
+          <ac:chgData name="Kumbrasev, Pavel" userId="426a0dbc-cadc-4d77-a483-9a0decc8d1d4" providerId="ADAL" clId="{0DB80E9F-0DA5-42D0-A28D-9262C50F652D}" dt="2021-06-07T11:54:39.600" v="0" actId="20577"/>
+          <ac:spMkLst>
+            <pc:docMk/>
+            <pc:sldMk cId="2310096094" sldId="297"/>
+            <ac:spMk id="2" creationId="{00000000-0000-0000-0000-000000000000}"/>
+          </ac:spMkLst>
+        </pc:spChg>
+      </pc:sldChg>
+      <pc:sldChg chg="modSp mod">
+        <pc:chgData name="Kumbrasev, Pavel" userId="426a0dbc-cadc-4d77-a483-9a0decc8d1d4" providerId="ADAL" clId="{0DB80E9F-0DA5-42D0-A28D-9262C50F652D}" dt="2021-06-09T12:09:03.994" v="6" actId="6549"/>
+        <pc:sldMkLst>
+          <pc:docMk/>
+          <pc:sldMk cId="1526239062" sldId="298"/>
+        </pc:sldMkLst>
+        <pc:spChg chg="mod">
+          <ac:chgData name="Kumbrasev, Pavel" userId="426a0dbc-cadc-4d77-a483-9a0decc8d1d4" providerId="ADAL" clId="{0DB80E9F-0DA5-42D0-A28D-9262C50F652D}" dt="2021-06-09T12:08:58.373" v="4" actId="21"/>
+          <ac:spMkLst>
+            <pc:docMk/>
+            <pc:sldMk cId="1526239062" sldId="298"/>
+            <ac:spMk id="8" creationId="{49BC0FC2-5538-4D69-A8CC-837F9B21AF5A}"/>
+          </ac:spMkLst>
+        </pc:spChg>
+        <pc:spChg chg="mod">
+          <ac:chgData name="Kumbrasev, Pavel" userId="426a0dbc-cadc-4d77-a483-9a0decc8d1d4" providerId="ADAL" clId="{0DB80E9F-0DA5-42D0-A28D-9262C50F652D}" dt="2021-06-09T12:09:03.994" v="6" actId="6549"/>
+          <ac:spMkLst>
+            <pc:docMk/>
+            <pc:sldMk cId="1526239062" sldId="298"/>
+            <ac:spMk id="13" creationId="{B5706B7F-BAEF-4F98-A45C-A28DAFA327CF}"/>
+          </ac:spMkLst>
+        </pc:spChg>
+        <pc:cxnChg chg="mod">
+          <ac:chgData name="Kumbrasev, Pavel" userId="426a0dbc-cadc-4d77-a483-9a0decc8d1d4" providerId="ADAL" clId="{0DB80E9F-0DA5-42D0-A28D-9262C50F652D}" dt="2021-06-09T12:08:47.506" v="1" actId="1076"/>
+          <ac:cxnSpMkLst>
+            <pc:docMk/>
+            <pc:sldMk cId="1526239062" sldId="298"/>
+            <ac:cxnSpMk id="10" creationId="{A705DC16-B827-4E80-8661-B46D4C60D81E}"/>
+          </ac:cxnSpMkLst>
+        </pc:cxnChg>
+      </pc:sldChg>
+    </pc:docChg>
+  </pc:docChgLst>
 </pc:chgInfo>
 </file>
 
@@ -780,7 +843,7 @@
           <a:p>
             <a:fld id="{007F315A-AFDF-43DD-B866-35F98039EF11}" type="datetimeFigureOut">
               <a:rPr lang="en-US" smtClean="0"/>
-              <a:t>31-Mar-21</a:t>
+              <a:t>09-Jun-21</a:t>
             </a:fld>
             <a:endParaRPr lang="en-US"/>
           </a:p>
@@ -1589,7 +1652,7 @@
           <a:p>
             <a:fld id="{341B0F11-E737-412C-9BAB-2D582565E49D}" type="datetimeFigureOut">
               <a:rPr lang="en-US" smtClean="0"/>
-              <a:t>31-Mar-21</a:t>
+              <a:t>09-Jun-21</a:t>
             </a:fld>
             <a:endParaRPr lang="en-US"/>
           </a:p>
@@ -1787,7 +1850,7 @@
           <a:p>
             <a:fld id="{341B0F11-E737-412C-9BAB-2D582565E49D}" type="datetimeFigureOut">
               <a:rPr lang="en-US" smtClean="0"/>
-              <a:t>31-Mar-21</a:t>
+              <a:t>09-Jun-21</a:t>
             </a:fld>
             <a:endParaRPr lang="en-US"/>
           </a:p>
@@ -1995,7 +2058,7 @@
           <a:p>
             <a:fld id="{341B0F11-E737-412C-9BAB-2D582565E49D}" type="datetimeFigureOut">
               <a:rPr lang="en-US" smtClean="0"/>
-              <a:t>31-Mar-21</a:t>
+              <a:t>09-Jun-21</a:t>
             </a:fld>
             <a:endParaRPr lang="en-US"/>
           </a:p>
@@ -2392,7 +2455,7 @@
           <a:p>
             <a:fld id="{341B0F11-E737-412C-9BAB-2D582565E49D}" type="datetimeFigureOut">
               <a:rPr lang="en-US" smtClean="0"/>
-              <a:t>31-Mar-21</a:t>
+              <a:t>09-Jun-21</a:t>
             </a:fld>
             <a:endParaRPr lang="en-US"/>
           </a:p>
@@ -2667,7 +2730,7 @@
           <a:p>
             <a:fld id="{341B0F11-E737-412C-9BAB-2D582565E49D}" type="datetimeFigureOut">
               <a:rPr lang="en-US" smtClean="0"/>
-              <a:t>31-Mar-21</a:t>
+              <a:t>09-Jun-21</a:t>
             </a:fld>
             <a:endParaRPr lang="en-US"/>
           </a:p>
@@ -2932,7 +2995,7 @@
           <a:p>
             <a:fld id="{341B0F11-E737-412C-9BAB-2D582565E49D}" type="datetimeFigureOut">
               <a:rPr lang="en-US" smtClean="0"/>
-              <a:t>31-Mar-21</a:t>
+              <a:t>09-Jun-21</a:t>
             </a:fld>
             <a:endParaRPr lang="en-US"/>
           </a:p>
@@ -3344,7 +3407,7 @@
           <a:p>
             <a:fld id="{341B0F11-E737-412C-9BAB-2D582565E49D}" type="datetimeFigureOut">
               <a:rPr lang="en-US" smtClean="0"/>
-              <a:t>31-Mar-21</a:t>
+              <a:t>09-Jun-21</a:t>
             </a:fld>
             <a:endParaRPr lang="en-US"/>
           </a:p>
@@ -3485,7 +3548,7 @@
           <a:p>
             <a:fld id="{341B0F11-E737-412C-9BAB-2D582565E49D}" type="datetimeFigureOut">
               <a:rPr lang="en-US" smtClean="0"/>
-              <a:t>31-Mar-21</a:t>
+              <a:t>09-Jun-21</a:t>
             </a:fld>
             <a:endParaRPr lang="en-US"/>
           </a:p>
@@ -3598,7 +3661,7 @@
           <a:p>
             <a:fld id="{341B0F11-E737-412C-9BAB-2D582565E49D}" type="datetimeFigureOut">
               <a:rPr lang="en-US" smtClean="0"/>
-              <a:t>31-Mar-21</a:t>
+              <a:t>09-Jun-21</a:t>
             </a:fld>
             <a:endParaRPr lang="en-US"/>
           </a:p>
@@ -3909,7 +3972,7 @@
           <a:p>
             <a:fld id="{341B0F11-E737-412C-9BAB-2D582565E49D}" type="datetimeFigureOut">
               <a:rPr lang="en-US" smtClean="0"/>
-              <a:t>31-Mar-21</a:t>
+              <a:t>09-Jun-21</a:t>
             </a:fld>
             <a:endParaRPr lang="en-US"/>
           </a:p>
@@ -4197,7 +4260,7 @@
           <a:p>
             <a:fld id="{341B0F11-E737-412C-9BAB-2D582565E49D}" type="datetimeFigureOut">
               <a:rPr lang="en-US" smtClean="0"/>
-              <a:t>31-Mar-21</a:t>
+              <a:t>09-Jun-21</a:t>
             </a:fld>
             <a:endParaRPr lang="en-US"/>
           </a:p>
@@ -4438,7 +4501,7 @@
           <a:p>
             <a:fld id="{341B0F11-E737-412C-9BAB-2D582565E49D}" type="datetimeFigureOut">
               <a:rPr lang="en-US" smtClean="0"/>
-              <a:t>31-Mar-21</a:t>
+              <a:t>09-Jun-21</a:t>
             </a:fld>
             <a:endParaRPr lang="en-US"/>
           </a:p>
@@ -4884,7 +4947,7 @@
                   <a:schemeClr val="tx2"/>
                 </a:solidFill>
               </a:rPr>
-              <a:t>Type Conversion</a:t>
+              <a:t>Type Conversions</a:t>
             </a:r>
           </a:p>
         </p:txBody>
@@ -5369,7 +5432,7 @@
         </p:nvSpPr>
         <p:spPr>
           <a:xfrm>
-            <a:off x="1052565" y="3771250"/>
+            <a:off x="1132216" y="3771250"/>
             <a:ext cx="4728039" cy="1183949"/>
           </a:xfrm>
           <a:prstGeom prst="ellipse">
@@ -5413,7 +5476,7 @@
                   <a:schemeClr val="tx1"/>
                 </a:solidFill>
               </a:rPr>
-              <a:t>Implicit conversion</a:t>
+              <a:t>Explicit conversion</a:t>
             </a:r>
           </a:p>
         </p:txBody>
@@ -5436,8 +5499,8 @@
         </p:nvCxnSpPr>
         <p:spPr>
           <a:xfrm flipH="1">
-            <a:off x="3416584" y="2754299"/>
-            <a:ext cx="2679416" cy="1016951"/>
+            <a:off x="3496236" y="2754299"/>
+            <a:ext cx="2599765" cy="1016951"/>
           </a:xfrm>
           <a:prstGeom prst="straightConnector1">
             <a:avLst/>
@@ -5523,7 +5586,7 @@
                   <a:schemeClr val="tx1"/>
                 </a:solidFill>
               </a:rPr>
-              <a:t>Explicit conversion</a:t>
+              <a:t>Implicit conversion</a:t>
             </a:r>
           </a:p>
         </p:txBody>

</xml_diff>

<commit_message>
Improvements in cast lecture (#21)
Co-authored-by: Kochin, Ivan <kochin.ivan@intel.com>
Co-authored-by: Ivan Kochin <iv.kochin@gmail.com>
</commit_message>
<xml_diff>
--- a/05_casts/05_Type_Conversion.pptx
+++ b/05_casts/05_Type_Conversion.pptx
@@ -115,6 +115,14 @@
     </p:ext>
   </p:extLst>
 </p:presentation>
+</file>
+
+<file path=ppt/revisionInfo.xml><?xml version="1.0" encoding="utf-8"?>
+<p1510:revInfo xmlns:a="http://schemas.openxmlformats.org/drawingml/2006/main" xmlns:r="http://schemas.openxmlformats.org/officeDocument/2006/relationships" xmlns:p1510="http://schemas.microsoft.com/office/powerpoint/2015/10/main">
+  <p1510:revLst>
+    <p1510:client id="{0DB80E9F-0DA5-42D0-A28D-9262C50F652D}" v="2" dt="2021-06-09T12:08:59.919"/>
+  </p1510:revLst>
+</p1510:revInfo>
 </file>
 
 <file path=ppt/changesInfos/changesInfo1.xml><?xml version="1.0" encoding="utf-8"?>
@@ -695,6 +703,61 @@
       </pc:sldMasterChg>
     </pc:docChg>
   </pc:docChgLst>
+  <pc:docChgLst>
+    <pc:chgData name="Kumbrasev, Pavel" userId="426a0dbc-cadc-4d77-a483-9a0decc8d1d4" providerId="ADAL" clId="{0DB80E9F-0DA5-42D0-A28D-9262C50F652D}"/>
+    <pc:docChg chg="modSld">
+      <pc:chgData name="Kumbrasev, Pavel" userId="426a0dbc-cadc-4d77-a483-9a0decc8d1d4" providerId="ADAL" clId="{0DB80E9F-0DA5-42D0-A28D-9262C50F652D}" dt="2021-06-09T12:09:03.994" v="6" actId="6549"/>
+      <pc:docMkLst>
+        <pc:docMk/>
+      </pc:docMkLst>
+      <pc:sldChg chg="modSp mod">
+        <pc:chgData name="Kumbrasev, Pavel" userId="426a0dbc-cadc-4d77-a483-9a0decc8d1d4" providerId="ADAL" clId="{0DB80E9F-0DA5-42D0-A28D-9262C50F652D}" dt="2021-06-07T11:54:39.600" v="0" actId="20577"/>
+        <pc:sldMkLst>
+          <pc:docMk/>
+          <pc:sldMk cId="2310096094" sldId="297"/>
+        </pc:sldMkLst>
+        <pc:spChg chg="mod">
+          <ac:chgData name="Kumbrasev, Pavel" userId="426a0dbc-cadc-4d77-a483-9a0decc8d1d4" providerId="ADAL" clId="{0DB80E9F-0DA5-42D0-A28D-9262C50F652D}" dt="2021-06-07T11:54:39.600" v="0" actId="20577"/>
+          <ac:spMkLst>
+            <pc:docMk/>
+            <pc:sldMk cId="2310096094" sldId="297"/>
+            <ac:spMk id="2" creationId="{00000000-0000-0000-0000-000000000000}"/>
+          </ac:spMkLst>
+        </pc:spChg>
+      </pc:sldChg>
+      <pc:sldChg chg="modSp mod">
+        <pc:chgData name="Kumbrasev, Pavel" userId="426a0dbc-cadc-4d77-a483-9a0decc8d1d4" providerId="ADAL" clId="{0DB80E9F-0DA5-42D0-A28D-9262C50F652D}" dt="2021-06-09T12:09:03.994" v="6" actId="6549"/>
+        <pc:sldMkLst>
+          <pc:docMk/>
+          <pc:sldMk cId="1526239062" sldId="298"/>
+        </pc:sldMkLst>
+        <pc:spChg chg="mod">
+          <ac:chgData name="Kumbrasev, Pavel" userId="426a0dbc-cadc-4d77-a483-9a0decc8d1d4" providerId="ADAL" clId="{0DB80E9F-0DA5-42D0-A28D-9262C50F652D}" dt="2021-06-09T12:08:58.373" v="4" actId="21"/>
+          <ac:spMkLst>
+            <pc:docMk/>
+            <pc:sldMk cId="1526239062" sldId="298"/>
+            <ac:spMk id="8" creationId="{49BC0FC2-5538-4D69-A8CC-837F9B21AF5A}"/>
+          </ac:spMkLst>
+        </pc:spChg>
+        <pc:spChg chg="mod">
+          <ac:chgData name="Kumbrasev, Pavel" userId="426a0dbc-cadc-4d77-a483-9a0decc8d1d4" providerId="ADAL" clId="{0DB80E9F-0DA5-42D0-A28D-9262C50F652D}" dt="2021-06-09T12:09:03.994" v="6" actId="6549"/>
+          <ac:spMkLst>
+            <pc:docMk/>
+            <pc:sldMk cId="1526239062" sldId="298"/>
+            <ac:spMk id="13" creationId="{B5706B7F-BAEF-4F98-A45C-A28DAFA327CF}"/>
+          </ac:spMkLst>
+        </pc:spChg>
+        <pc:cxnChg chg="mod">
+          <ac:chgData name="Kumbrasev, Pavel" userId="426a0dbc-cadc-4d77-a483-9a0decc8d1d4" providerId="ADAL" clId="{0DB80E9F-0DA5-42D0-A28D-9262C50F652D}" dt="2021-06-09T12:08:47.506" v="1" actId="1076"/>
+          <ac:cxnSpMkLst>
+            <pc:docMk/>
+            <pc:sldMk cId="1526239062" sldId="298"/>
+            <ac:cxnSpMk id="10" creationId="{A705DC16-B827-4E80-8661-B46D4C60D81E}"/>
+          </ac:cxnSpMkLst>
+        </pc:cxnChg>
+      </pc:sldChg>
+    </pc:docChg>
+  </pc:docChgLst>
 </pc:chgInfo>
 </file>
 
@@ -780,7 +843,7 @@
           <a:p>
             <a:fld id="{007F315A-AFDF-43DD-B866-35F98039EF11}" type="datetimeFigureOut">
               <a:rPr lang="en-US" smtClean="0"/>
-              <a:t>31-Mar-21</a:t>
+              <a:t>09-Jun-21</a:t>
             </a:fld>
             <a:endParaRPr lang="en-US"/>
           </a:p>
@@ -1589,7 +1652,7 @@
           <a:p>
             <a:fld id="{341B0F11-E737-412C-9BAB-2D582565E49D}" type="datetimeFigureOut">
               <a:rPr lang="en-US" smtClean="0"/>
-              <a:t>31-Mar-21</a:t>
+              <a:t>09-Jun-21</a:t>
             </a:fld>
             <a:endParaRPr lang="en-US"/>
           </a:p>
@@ -1787,7 +1850,7 @@
           <a:p>
             <a:fld id="{341B0F11-E737-412C-9BAB-2D582565E49D}" type="datetimeFigureOut">
               <a:rPr lang="en-US" smtClean="0"/>
-              <a:t>31-Mar-21</a:t>
+              <a:t>09-Jun-21</a:t>
             </a:fld>
             <a:endParaRPr lang="en-US"/>
           </a:p>
@@ -1995,7 +2058,7 @@
           <a:p>
             <a:fld id="{341B0F11-E737-412C-9BAB-2D582565E49D}" type="datetimeFigureOut">
               <a:rPr lang="en-US" smtClean="0"/>
-              <a:t>31-Mar-21</a:t>
+              <a:t>09-Jun-21</a:t>
             </a:fld>
             <a:endParaRPr lang="en-US"/>
           </a:p>
@@ -2392,7 +2455,7 @@
           <a:p>
             <a:fld id="{341B0F11-E737-412C-9BAB-2D582565E49D}" type="datetimeFigureOut">
               <a:rPr lang="en-US" smtClean="0"/>
-              <a:t>31-Mar-21</a:t>
+              <a:t>09-Jun-21</a:t>
             </a:fld>
             <a:endParaRPr lang="en-US"/>
           </a:p>
@@ -2667,7 +2730,7 @@
           <a:p>
             <a:fld id="{341B0F11-E737-412C-9BAB-2D582565E49D}" type="datetimeFigureOut">
               <a:rPr lang="en-US" smtClean="0"/>
-              <a:t>31-Mar-21</a:t>
+              <a:t>09-Jun-21</a:t>
             </a:fld>
             <a:endParaRPr lang="en-US"/>
           </a:p>
@@ -2932,7 +2995,7 @@
           <a:p>
             <a:fld id="{341B0F11-E737-412C-9BAB-2D582565E49D}" type="datetimeFigureOut">
               <a:rPr lang="en-US" smtClean="0"/>
-              <a:t>31-Mar-21</a:t>
+              <a:t>09-Jun-21</a:t>
             </a:fld>
             <a:endParaRPr lang="en-US"/>
           </a:p>
@@ -3344,7 +3407,7 @@
           <a:p>
             <a:fld id="{341B0F11-E737-412C-9BAB-2D582565E49D}" type="datetimeFigureOut">
               <a:rPr lang="en-US" smtClean="0"/>
-              <a:t>31-Mar-21</a:t>
+              <a:t>09-Jun-21</a:t>
             </a:fld>
             <a:endParaRPr lang="en-US"/>
           </a:p>
@@ -3485,7 +3548,7 @@
           <a:p>
             <a:fld id="{341B0F11-E737-412C-9BAB-2D582565E49D}" type="datetimeFigureOut">
               <a:rPr lang="en-US" smtClean="0"/>
-              <a:t>31-Mar-21</a:t>
+              <a:t>09-Jun-21</a:t>
             </a:fld>
             <a:endParaRPr lang="en-US"/>
           </a:p>
@@ -3598,7 +3661,7 @@
           <a:p>
             <a:fld id="{341B0F11-E737-412C-9BAB-2D582565E49D}" type="datetimeFigureOut">
               <a:rPr lang="en-US" smtClean="0"/>
-              <a:t>31-Mar-21</a:t>
+              <a:t>09-Jun-21</a:t>
             </a:fld>
             <a:endParaRPr lang="en-US"/>
           </a:p>
@@ -3909,7 +3972,7 @@
           <a:p>
             <a:fld id="{341B0F11-E737-412C-9BAB-2D582565E49D}" type="datetimeFigureOut">
               <a:rPr lang="en-US" smtClean="0"/>
-              <a:t>31-Mar-21</a:t>
+              <a:t>09-Jun-21</a:t>
             </a:fld>
             <a:endParaRPr lang="en-US"/>
           </a:p>
@@ -4197,7 +4260,7 @@
           <a:p>
             <a:fld id="{341B0F11-E737-412C-9BAB-2D582565E49D}" type="datetimeFigureOut">
               <a:rPr lang="en-US" smtClean="0"/>
-              <a:t>31-Mar-21</a:t>
+              <a:t>09-Jun-21</a:t>
             </a:fld>
             <a:endParaRPr lang="en-US"/>
           </a:p>
@@ -4438,7 +4501,7 @@
           <a:p>
             <a:fld id="{341B0F11-E737-412C-9BAB-2D582565E49D}" type="datetimeFigureOut">
               <a:rPr lang="en-US" smtClean="0"/>
-              <a:t>31-Mar-21</a:t>
+              <a:t>09-Jun-21</a:t>
             </a:fld>
             <a:endParaRPr lang="en-US"/>
           </a:p>
@@ -4884,7 +4947,7 @@
                   <a:schemeClr val="tx2"/>
                 </a:solidFill>
               </a:rPr>
-              <a:t>Type Conversion</a:t>
+              <a:t>Type Conversions</a:t>
             </a:r>
           </a:p>
         </p:txBody>
@@ -5369,7 +5432,7 @@
         </p:nvSpPr>
         <p:spPr>
           <a:xfrm>
-            <a:off x="1052565" y="3771250"/>
+            <a:off x="1132216" y="3771250"/>
             <a:ext cx="4728039" cy="1183949"/>
           </a:xfrm>
           <a:prstGeom prst="ellipse">
@@ -5413,7 +5476,7 @@
                   <a:schemeClr val="tx1"/>
                 </a:solidFill>
               </a:rPr>
-              <a:t>Implicit conversion</a:t>
+              <a:t>Explicit conversion</a:t>
             </a:r>
           </a:p>
         </p:txBody>
@@ -5436,8 +5499,8 @@
         </p:nvCxnSpPr>
         <p:spPr>
           <a:xfrm flipH="1">
-            <a:off x="3416584" y="2754299"/>
-            <a:ext cx="2679416" cy="1016951"/>
+            <a:off x="3496236" y="2754299"/>
+            <a:ext cx="2599765" cy="1016951"/>
           </a:xfrm>
           <a:prstGeom prst="straightConnector1">
             <a:avLst/>
@@ -5523,7 +5586,7 @@
                   <a:schemeClr val="tx1"/>
                 </a:solidFill>
               </a:rPr>
-              <a:t>Explicit conversion</a:t>
+              <a:t>Implicit conversion</a:t>
             </a:r>
           </a:p>
         </p:txBody>

</xml_diff>